<commit_message>
updated Biz Ops Dashboard Slide Decks (in both formats)
</commit_message>
<xml_diff>
--- a/Yelp Biz Ops Dashboard Presentation .pptx
+++ b/Yelp Biz Ops Dashboard Presentation .pptx
@@ -26,6 +26,8 @@
     <p:sldId id="271" r:id="rId23"/>
     <p:sldId id="272" r:id="rId24"/>
     <p:sldId id="273" r:id="rId25"/>
+    <p:sldId id="274" r:id="rId26"/>
+    <p:sldId id="275" r:id="rId27"/>
   </p:sldIdLst>
   <p:sldSz cx="13004800" cy="9753600"/>
   <p:notesSz cx="6858000" cy="9144000"/>
@@ -4495,98 +4497,9 @@
           <a:chExt cx="0" cy="0"/>
         </a:xfrm>
       </p:grpSpPr>
-      <p:sp>
-        <p:nvSpPr>
-          <p:cNvPr id="189" name="Line"/>
-          <p:cNvSpPr/>
-          <p:nvPr>
-            <p:ph type="body" idx="14"/>
-          </p:nvPr>
-        </p:nvSpPr>
-        <p:spPr>
-          <a:prstGeom prst="line">
-            <a:avLst/>
-          </a:prstGeom>
-        </p:spPr>
-        <p:txBody>
-          <a:bodyPr/>
-          <a:lstStyle/>
-          <a:p>
-            <a:pPr marL="0" indent="0" defTabSz="457200">
-              <a:spcBef>
-                <a:spcPts val="0"/>
-              </a:spcBef>
-              <a:buSzTx/>
-              <a:buFontTx/>
-              <a:buNone/>
-              <a:defRPr sz="1200">
-                <a:solidFill>
-                  <a:srgbClr val="000000"/>
-                </a:solidFill>
-                <a:latin typeface="Helvetica"/>
-                <a:ea typeface="Helvetica"/>
-                <a:cs typeface="Helvetica"/>
-                <a:sym typeface="Helvetica"/>
-              </a:defRPr>
-            </a:pPr>
-          </a:p>
-        </p:txBody>
-      </p:sp>
-      <p:sp>
-        <p:nvSpPr>
-          <p:cNvPr id="190" name="Behind the Scenes notes"/>
-          <p:cNvSpPr txBox="1"/>
-          <p:nvPr>
-            <p:ph type="title"/>
-          </p:nvPr>
-        </p:nvSpPr>
-        <p:spPr>
-          <a:prstGeom prst="rect">
-            <a:avLst/>
-          </a:prstGeom>
-        </p:spPr>
-        <p:txBody>
-          <a:bodyPr/>
-          <a:lstStyle>
-            <a:lvl1pPr defTabSz="543305">
-              <a:spcBef>
-                <a:spcPts val="2100"/>
-              </a:spcBef>
-              <a:defRPr sz="4836"/>
-            </a:lvl1pPr>
-          </a:lstStyle>
-          <a:p>
-            <a:pPr/>
-            <a:r>
-              <a:t>Behind the Scenes notes</a:t>
-            </a:r>
-          </a:p>
-        </p:txBody>
-      </p:sp>
-      <p:sp>
-        <p:nvSpPr>
-          <p:cNvPr id="191" name="Body"/>
-          <p:cNvSpPr txBox="1"/>
-          <p:nvPr>
-            <p:ph type="body" sz="half" idx="1"/>
-          </p:nvPr>
-        </p:nvSpPr>
-        <p:spPr>
-          <a:prstGeom prst="rect">
-            <a:avLst/>
-          </a:prstGeom>
-        </p:spPr>
-        <p:txBody>
-          <a:bodyPr/>
-          <a:lstStyle/>
-          <a:p>
-            <a:pPr/>
-          </a:p>
-        </p:txBody>
-      </p:sp>
       <p:pic>
         <p:nvPicPr>
-          <p:cNvPr id="192" name="pasted-image.tiff" descr="pasted-image.tiff"/>
+          <p:cNvPr id="189" name="pasted-image.tiff" descr="pasted-image.tiff"/>
           <p:cNvPicPr>
             <a:picLocks noChangeAspect="1"/>
           </p:cNvPicPr>
@@ -4594,6 +4507,7 @@
         </p:nvPicPr>
         <p:blipFill>
           <a:blip r:embed="rId2">
+            <a:alphaModFix amt="24938"/>
             <a:extLst/>
           </a:blip>
           <a:srcRect l="16992" t="0" r="16992" b="0"/>
@@ -4603,7 +4517,7 @@
         </p:blipFill>
         <p:spPr>
           <a:xfrm>
-            <a:off x="-1168400" y="-2032000"/>
+            <a:off x="-1905000" y="3276600"/>
             <a:ext cx="6438900" cy="9753600"/>
           </a:xfrm>
           <a:prstGeom prst="rect">
@@ -4640,163 +4554,45 @@
           <a:chExt cx="0" cy="0"/>
         </a:xfrm>
       </p:grpSpPr>
-      <p:pic>
-        <p:nvPicPr>
-          <p:cNvPr id="194" name="pasted-image.tiff" descr="pasted-image.tiff"/>
-          <p:cNvPicPr>
-            <a:picLocks noChangeAspect="1"/>
-          </p:cNvPicPr>
-          <p:nvPr/>
-        </p:nvPicPr>
-        <p:blipFill>
-          <a:blip r:embed="rId2">
-            <a:extLst/>
-          </a:blip>
-          <a:stretch>
-            <a:fillRect/>
-          </a:stretch>
-        </p:blipFill>
+      <p:sp>
+        <p:nvSpPr>
+          <p:cNvPr id="191" name="https://github.com/mgd1984/Yelp-Analytics-Dashboard"/>
+          <p:cNvSpPr txBox="1"/>
+          <p:nvPr>
+            <p:ph type="body" idx="13"/>
+          </p:nvPr>
+        </p:nvSpPr>
         <p:spPr>
           <a:xfrm>
-            <a:off x="6248400" y="-1727200"/>
-            <a:ext cx="9753600" cy="9753600"/>
+            <a:off x="1943100" y="3870536"/>
+            <a:ext cx="10490200" cy="1778001"/>
           </a:xfrm>
           <a:prstGeom prst="rect">
             <a:avLst/>
           </a:prstGeom>
-          <a:ln w="12700">
-            <a:miter lim="400000"/>
-          </a:ln>
-        </p:spPr>
-      </p:pic>
-      <p:sp>
-        <p:nvSpPr>
-          <p:cNvPr id="195" name="Potential applications"/>
-          <p:cNvSpPr txBox="1"/>
-          <p:nvPr>
-            <p:ph type="title"/>
-          </p:nvPr>
-        </p:nvSpPr>
-        <p:spPr>
-          <a:xfrm>
-            <a:off x="571500" y="1655018"/>
-            <a:ext cx="6773317" cy="4720382"/>
-          </a:xfrm>
-          <a:prstGeom prst="rect">
-            <a:avLst/>
-          </a:prstGeom>
-        </p:spPr>
-        <p:txBody>
-          <a:bodyPr anchor="b"/>
+        </p:spPr>
+        <p:txBody>
+          <a:bodyPr/>
           <a:lstStyle>
-            <a:lvl1pPr algn="r">
-              <a:lnSpc>
-                <a:spcPct val="80000"/>
-              </a:lnSpc>
-              <a:spcBef>
-                <a:spcPts val="0"/>
-              </a:spcBef>
-              <a:defRPr sz="10000">
+            <a:lvl1pPr>
+              <a:defRPr u="sng">
                 <a:solidFill>
-                  <a:srgbClr val="5C5C5C"/>
+                  <a:srgbClr val="FF2600"/>
                 </a:solidFill>
+                <a:hlinkClick r:id="rId2" invalidUrl="" action="" tgtFrame="" tooltip="" history="1" highlightClick="0" endSnd="0"/>
               </a:defRPr>
             </a:lvl1pPr>
           </a:lstStyle>
           <a:p>
-            <a:pPr/>
-            <a:r>
-              <a:t>Potential applications</a:t>
-            </a:r>
-          </a:p>
-        </p:txBody>
-      </p:sp>
-      <p:sp>
-        <p:nvSpPr>
-          <p:cNvPr id="196" name="A look at our code &amp; Github repository for this project"/>
-          <p:cNvSpPr txBox="1"/>
-          <p:nvPr>
-            <p:ph type="body" sz="quarter" idx="1"/>
-          </p:nvPr>
-        </p:nvSpPr>
-        <p:spPr>
-          <a:xfrm>
-            <a:off x="571500" y="6235700"/>
-            <a:ext cx="6451600" cy="2781797"/>
-          </a:xfrm>
-          <a:prstGeom prst="rect">
-            <a:avLst/>
-          </a:prstGeom>
-        </p:spPr>
-        <p:txBody>
-          <a:bodyPr/>
-          <a:lstStyle>
-            <a:lvl1pPr marL="0" indent="0" algn="r">
-              <a:lnSpc>
-                <a:spcPct val="70000"/>
-              </a:lnSpc>
-              <a:spcBef>
-                <a:spcPts val="600"/>
-              </a:spcBef>
-              <a:buSzTx/>
-              <a:buFontTx/>
-              <a:buNone/>
-              <a:defRPr i="1" sz="4800">
-                <a:solidFill>
-                  <a:srgbClr val="747676"/>
-                </a:solidFill>
-              </a:defRPr>
-            </a:lvl1pPr>
-          </a:lstStyle>
-          <a:p>
-            <a:pPr/>
-            <a:r>
-              <a:t>A look at our code &amp; Github repository for this project</a:t>
-            </a:r>
-          </a:p>
-        </p:txBody>
-      </p:sp>
-      <p:sp>
-        <p:nvSpPr>
-          <p:cNvPr id="197" name="Line"/>
-          <p:cNvSpPr/>
-          <p:nvPr/>
-        </p:nvSpPr>
-        <p:spPr>
-          <a:xfrm flipV="1">
-            <a:off x="571500" y="6184898"/>
-            <a:ext cx="6451600" cy="3"/>
-          </a:xfrm>
-          <a:prstGeom prst="line">
-            <a:avLst/>
-          </a:prstGeom>
-          <a:ln w="38100" cap="rnd">
-            <a:solidFill>
-              <a:srgbClr val="747676"/>
-            </a:solidFill>
-            <a:custDash>
-              <a:ds d="100000" sp="200000"/>
-            </a:custDash>
-          </a:ln>
-        </p:spPr>
-        <p:txBody>
-          <a:bodyPr lIns="50800" tIns="50800" rIns="50800" bIns="50800" anchor="ctr"/>
-          <a:lstStyle/>
-          <a:p>
-            <a:pPr defTabSz="457200">
-              <a:spcBef>
-                <a:spcPts val="0"/>
-              </a:spcBef>
-              <a:defRPr i="0" spc="0" sz="1200">
-                <a:solidFill>
-                  <a:srgbClr val="000000"/>
-                </a:solidFill>
-                <a:latin typeface="Helvetica"/>
-                <a:ea typeface="Helvetica"/>
-                <a:cs typeface="Helvetica"/>
-                <a:sym typeface="Helvetica"/>
-              </a:defRPr>
+            <a:pPr>
+              <a:defRPr u="none"/>
             </a:pPr>
+            <a:r>
+              <a:rPr u="sng">
+                <a:hlinkClick r:id="rId2" invalidUrl="" action="" tgtFrame="" tooltip="" history="1" highlightClick="0" endSnd="0"/>
+              </a:rPr>
+              <a:t>https://github.com/mgd1984/Yelp-Analytics-Dashboard</a:t>
+            </a:r>
           </a:p>
         </p:txBody>
       </p:sp>
@@ -4826,31 +4622,154 @@
           <a:chExt cx="0" cy="0"/>
         </a:xfrm>
       </p:grpSpPr>
-      <p:sp>
-        <p:nvSpPr>
-          <p:cNvPr id="199" name="Line"/>
-          <p:cNvSpPr/>
-          <p:nvPr>
-            <p:ph type="body" idx="14"/>
-          </p:nvPr>
-        </p:nvSpPr>
-        <p:spPr>
-          <a:prstGeom prst="line">
+      <p:pic>
+        <p:nvPicPr>
+          <p:cNvPr id="193" name="pasted-image.tiff" descr="pasted-image.tiff"/>
+          <p:cNvPicPr>
+            <a:picLocks noChangeAspect="1"/>
+          </p:cNvPicPr>
+          <p:nvPr/>
+        </p:nvPicPr>
+        <p:blipFill>
+          <a:blip r:embed="rId2">
+            <a:extLst/>
+          </a:blip>
+          <a:stretch>
+            <a:fillRect/>
+          </a:stretch>
+        </p:blipFill>
+        <p:spPr>
+          <a:xfrm>
+            <a:off x="6248400" y="-1727200"/>
+            <a:ext cx="9753600" cy="9753600"/>
+          </a:xfrm>
+          <a:prstGeom prst="rect">
+            <a:avLst/>
+          </a:prstGeom>
+          <a:ln w="12700">
+            <a:miter lim="400000"/>
+          </a:ln>
+        </p:spPr>
+      </p:pic>
+      <p:sp>
+        <p:nvSpPr>
+          <p:cNvPr id="194" name="Potential applications"/>
+          <p:cNvSpPr txBox="1"/>
+          <p:nvPr>
+            <p:ph type="title"/>
+          </p:nvPr>
+        </p:nvSpPr>
+        <p:spPr>
+          <a:xfrm>
+            <a:off x="571500" y="1655018"/>
+            <a:ext cx="6773317" cy="4720382"/>
+          </a:xfrm>
+          <a:prstGeom prst="rect">
+            <a:avLst/>
+          </a:prstGeom>
+        </p:spPr>
+        <p:txBody>
+          <a:bodyPr anchor="b"/>
+          <a:lstStyle>
+            <a:lvl1pPr algn="r">
+              <a:lnSpc>
+                <a:spcPct val="80000"/>
+              </a:lnSpc>
+              <a:spcBef>
+                <a:spcPts val="0"/>
+              </a:spcBef>
+              <a:defRPr sz="10000">
+                <a:solidFill>
+                  <a:srgbClr val="5C5C5C"/>
+                </a:solidFill>
+              </a:defRPr>
+            </a:lvl1pPr>
+          </a:lstStyle>
+          <a:p>
+            <a:pPr/>
+            <a:r>
+              <a:t>Potential applications</a:t>
+            </a:r>
+          </a:p>
+        </p:txBody>
+      </p:sp>
+      <p:sp>
+        <p:nvSpPr>
+          <p:cNvPr id="195" name="A look at our code &amp; Github repository for this project"/>
+          <p:cNvSpPr txBox="1"/>
+          <p:nvPr>
+            <p:ph type="body" sz="quarter" idx="1"/>
+          </p:nvPr>
+        </p:nvSpPr>
+        <p:spPr>
+          <a:xfrm>
+            <a:off x="571500" y="6235700"/>
+            <a:ext cx="6451600" cy="2781797"/>
+          </a:xfrm>
+          <a:prstGeom prst="rect">
             <a:avLst/>
           </a:prstGeom>
         </p:spPr>
         <p:txBody>
           <a:bodyPr/>
-          <a:lstStyle/>
-          <a:p>
-            <a:pPr marL="0" indent="0" defTabSz="457200">
-              <a:spcBef>
-                <a:spcPts val="0"/>
+          <a:lstStyle>
+            <a:lvl1pPr marL="0" indent="0" algn="r">
+              <a:lnSpc>
+                <a:spcPct val="70000"/>
+              </a:lnSpc>
+              <a:spcBef>
+                <a:spcPts val="600"/>
               </a:spcBef>
               <a:buSzTx/>
               <a:buFontTx/>
               <a:buNone/>
-              <a:defRPr sz="1200">
+              <a:defRPr i="1" sz="4800">
+                <a:solidFill>
+                  <a:srgbClr val="747676"/>
+                </a:solidFill>
+              </a:defRPr>
+            </a:lvl1pPr>
+          </a:lstStyle>
+          <a:p>
+            <a:pPr/>
+            <a:r>
+              <a:t>A look at our code &amp; Github repository for this project</a:t>
+            </a:r>
+          </a:p>
+        </p:txBody>
+      </p:sp>
+      <p:sp>
+        <p:nvSpPr>
+          <p:cNvPr id="196" name="Line"/>
+          <p:cNvSpPr/>
+          <p:nvPr/>
+        </p:nvSpPr>
+        <p:spPr>
+          <a:xfrm flipV="1">
+            <a:off x="571500" y="6184898"/>
+            <a:ext cx="6451600" cy="3"/>
+          </a:xfrm>
+          <a:prstGeom prst="line">
+            <a:avLst/>
+          </a:prstGeom>
+          <a:ln w="38100" cap="rnd">
+            <a:solidFill>
+              <a:srgbClr val="747676"/>
+            </a:solidFill>
+            <a:custDash>
+              <a:ds d="100000" sp="200000"/>
+            </a:custDash>
+          </a:ln>
+        </p:spPr>
+        <p:txBody>
+          <a:bodyPr lIns="50800" tIns="50800" rIns="50800" bIns="50800" anchor="ctr"/>
+          <a:lstStyle/>
+          <a:p>
+            <a:pPr defTabSz="457200">
+              <a:spcBef>
+                <a:spcPts val="0"/>
+              </a:spcBef>
+              <a:defRPr i="0" spc="0" sz="1200">
                 <a:solidFill>
                   <a:srgbClr val="000000"/>
                 </a:solidFill>
@@ -4863,88 +4782,6 @@
           </a:p>
         </p:txBody>
       </p:sp>
-      <p:sp>
-        <p:nvSpPr>
-          <p:cNvPr id="200" name="Behind the Scenes notes"/>
-          <p:cNvSpPr txBox="1"/>
-          <p:nvPr>
-            <p:ph type="title"/>
-          </p:nvPr>
-        </p:nvSpPr>
-        <p:spPr>
-          <a:prstGeom prst="rect">
-            <a:avLst/>
-          </a:prstGeom>
-        </p:spPr>
-        <p:txBody>
-          <a:bodyPr/>
-          <a:lstStyle>
-            <a:lvl1pPr defTabSz="543305">
-              <a:spcBef>
-                <a:spcPts val="2100"/>
-              </a:spcBef>
-              <a:defRPr sz="4836"/>
-            </a:lvl1pPr>
-          </a:lstStyle>
-          <a:p>
-            <a:pPr/>
-            <a:r>
-              <a:t>Behind the Scenes notes</a:t>
-            </a:r>
-          </a:p>
-        </p:txBody>
-      </p:sp>
-      <p:sp>
-        <p:nvSpPr>
-          <p:cNvPr id="201" name="Body"/>
-          <p:cNvSpPr txBox="1"/>
-          <p:nvPr>
-            <p:ph type="body" sz="half" idx="1"/>
-          </p:nvPr>
-        </p:nvSpPr>
-        <p:spPr>
-          <a:prstGeom prst="rect">
-            <a:avLst/>
-          </a:prstGeom>
-        </p:spPr>
-        <p:txBody>
-          <a:bodyPr/>
-          <a:lstStyle/>
-          <a:p>
-            <a:pPr/>
-          </a:p>
-        </p:txBody>
-      </p:sp>
-      <p:pic>
-        <p:nvPicPr>
-          <p:cNvPr id="202" name="pasted-image.tiff" descr="pasted-image.tiff"/>
-          <p:cNvPicPr>
-            <a:picLocks noChangeAspect="1"/>
-          </p:cNvPicPr>
-          <p:nvPr/>
-        </p:nvPicPr>
-        <p:blipFill>
-          <a:blip r:embed="rId2">
-            <a:extLst/>
-          </a:blip>
-          <a:srcRect l="16992" t="0" r="16992" b="0"/>
-          <a:stretch>
-            <a:fillRect/>
-          </a:stretch>
-        </p:blipFill>
-        <p:spPr>
-          <a:xfrm>
-            <a:off x="-1168400" y="-2032000"/>
-            <a:ext cx="6438900" cy="9753600"/>
-          </a:xfrm>
-          <a:prstGeom prst="rect">
-            <a:avLst/>
-          </a:prstGeom>
-          <a:ln w="12700">
-            <a:miter lim="400000"/>
-          </a:ln>
-        </p:spPr>
-      </p:pic>
     </p:spTree>
   </p:cSld>
   <p:clrMapOvr>
@@ -4971,154 +4808,31 @@
           <a:chExt cx="0" cy="0"/>
         </a:xfrm>
       </p:grpSpPr>
-      <p:pic>
-        <p:nvPicPr>
-          <p:cNvPr id="204" name="pasted-image.tiff" descr="pasted-image.tiff"/>
-          <p:cNvPicPr>
-            <a:picLocks noChangeAspect="1"/>
-          </p:cNvPicPr>
-          <p:nvPr/>
-        </p:nvPicPr>
-        <p:blipFill>
-          <a:blip r:embed="rId2">
-            <a:extLst/>
-          </a:blip>
-          <a:stretch>
-            <a:fillRect/>
-          </a:stretch>
-        </p:blipFill>
-        <p:spPr>
-          <a:xfrm>
-            <a:off x="6248400" y="-1727200"/>
-            <a:ext cx="9753600" cy="9753600"/>
-          </a:xfrm>
-          <a:prstGeom prst="rect">
-            <a:avLst/>
-          </a:prstGeom>
-          <a:ln w="12700">
-            <a:miter lim="400000"/>
-          </a:ln>
-        </p:spPr>
-      </p:pic>
-      <p:sp>
-        <p:nvSpPr>
-          <p:cNvPr id="205" name="Gauging Interest &amp; exploring opportunities"/>
-          <p:cNvSpPr txBox="1"/>
-          <p:nvPr>
-            <p:ph type="title"/>
-          </p:nvPr>
-        </p:nvSpPr>
-        <p:spPr>
-          <a:xfrm>
-            <a:off x="571500" y="1655018"/>
-            <a:ext cx="6773317" cy="4720382"/>
-          </a:xfrm>
-          <a:prstGeom prst="rect">
-            <a:avLst/>
-          </a:prstGeom>
-        </p:spPr>
-        <p:txBody>
-          <a:bodyPr anchor="b"/>
-          <a:lstStyle>
-            <a:lvl1pPr algn="r" defTabSz="531622">
-              <a:lnSpc>
-                <a:spcPct val="80000"/>
-              </a:lnSpc>
+      <p:sp>
+        <p:nvSpPr>
+          <p:cNvPr id="198" name="Line"/>
+          <p:cNvSpPr/>
+          <p:nvPr>
+            <p:ph type="body" idx="14"/>
+          </p:nvPr>
+        </p:nvSpPr>
+        <p:spPr>
+          <a:prstGeom prst="line">
+            <a:avLst/>
+          </a:prstGeom>
+        </p:spPr>
+        <p:txBody>
+          <a:bodyPr/>
+          <a:lstStyle/>
+          <a:p>
+            <a:pPr marL="0" indent="0" defTabSz="457200">
               <a:spcBef>
                 <a:spcPts val="0"/>
-              </a:spcBef>
-              <a:defRPr sz="9100">
-                <a:solidFill>
-                  <a:srgbClr val="5C5C5C"/>
-                </a:solidFill>
-              </a:defRPr>
-            </a:lvl1pPr>
-          </a:lstStyle>
-          <a:p>
-            <a:pPr/>
-            <a:r>
-              <a:t>Gauging Interest &amp; exploring opportunities  </a:t>
-            </a:r>
-          </a:p>
-        </p:txBody>
-      </p:sp>
-      <p:sp>
-        <p:nvSpPr>
-          <p:cNvPr id="206" name="A look beyond the specific code &amp; data, at the implications and opportunities this approach opens up."/>
-          <p:cNvSpPr txBox="1"/>
-          <p:nvPr>
-            <p:ph type="body" sz="quarter" idx="1"/>
-          </p:nvPr>
-        </p:nvSpPr>
-        <p:spPr>
-          <a:xfrm>
-            <a:off x="571500" y="6235700"/>
-            <a:ext cx="6451600" cy="2781797"/>
-          </a:xfrm>
-          <a:prstGeom prst="rect">
-            <a:avLst/>
-          </a:prstGeom>
-        </p:spPr>
-        <p:txBody>
-          <a:bodyPr/>
-          <a:lstStyle>
-            <a:lvl1pPr marL="0" indent="0" algn="r" defTabSz="508254">
-              <a:lnSpc>
-                <a:spcPct val="70000"/>
-              </a:lnSpc>
-              <a:spcBef>
-                <a:spcPts val="500"/>
               </a:spcBef>
               <a:buSzTx/>
               <a:buFontTx/>
               <a:buNone/>
-              <a:defRPr i="1" sz="4176">
-                <a:solidFill>
-                  <a:srgbClr val="747676"/>
-                </a:solidFill>
-              </a:defRPr>
-            </a:lvl1pPr>
-          </a:lstStyle>
-          <a:p>
-            <a:pPr/>
-            <a:r>
-              <a:t>A look beyond the specific code &amp; data, at the implications and opportunities this approach opens up. </a:t>
-            </a:r>
-          </a:p>
-        </p:txBody>
-      </p:sp>
-      <p:sp>
-        <p:nvSpPr>
-          <p:cNvPr id="207" name="Line"/>
-          <p:cNvSpPr/>
-          <p:nvPr/>
-        </p:nvSpPr>
-        <p:spPr>
-          <a:xfrm flipV="1">
-            <a:off x="571500" y="6184898"/>
-            <a:ext cx="6451600" cy="3"/>
-          </a:xfrm>
-          <a:prstGeom prst="line">
-            <a:avLst/>
-          </a:prstGeom>
-          <a:ln w="38100" cap="rnd">
-            <a:solidFill>
-              <a:srgbClr val="747676"/>
-            </a:solidFill>
-            <a:custDash>
-              <a:ds d="100000" sp="200000"/>
-            </a:custDash>
-          </a:ln>
-        </p:spPr>
-        <p:txBody>
-          <a:bodyPr lIns="50800" tIns="50800" rIns="50800" bIns="50800" anchor="ctr"/>
-          <a:lstStyle/>
-          <a:p>
-            <a:pPr defTabSz="457200">
-              <a:spcBef>
-                <a:spcPts val="0"/>
-              </a:spcBef>
-              <a:defRPr i="0" spc="0" sz="1200">
+              <a:defRPr sz="1200">
                 <a:solidFill>
                   <a:srgbClr val="000000"/>
                 </a:solidFill>
@@ -5131,6 +4845,229 @@
           </a:p>
         </p:txBody>
       </p:sp>
+      <p:sp>
+        <p:nvSpPr>
+          <p:cNvPr id="199" name="Potential Biz-Ops Use Cases"/>
+          <p:cNvSpPr txBox="1"/>
+          <p:nvPr>
+            <p:ph type="title"/>
+          </p:nvPr>
+        </p:nvSpPr>
+        <p:spPr>
+          <a:prstGeom prst="rect">
+            <a:avLst/>
+          </a:prstGeom>
+        </p:spPr>
+        <p:txBody>
+          <a:bodyPr/>
+          <a:lstStyle>
+            <a:lvl1pPr defTabSz="484886">
+              <a:spcBef>
+                <a:spcPts val="1900"/>
+              </a:spcBef>
+              <a:defRPr sz="4316"/>
+            </a:lvl1pPr>
+          </a:lstStyle>
+          <a:p>
+            <a:pPr/>
+            <a:r>
+              <a:t>Potential Biz-Ops Use Cases</a:t>
+            </a:r>
+          </a:p>
+        </p:txBody>
+      </p:sp>
+      <p:sp>
+        <p:nvSpPr>
+          <p:cNvPr id="200" name="Marketing: new &amp; more efficient ways to acquire customers, and how R could be used to enhance market-mix modelling techniques…"/>
+          <p:cNvSpPr txBox="1"/>
+          <p:nvPr>
+            <p:ph type="body" sz="half" idx="1"/>
+          </p:nvPr>
+        </p:nvSpPr>
+        <p:spPr>
+          <a:prstGeom prst="rect">
+            <a:avLst/>
+          </a:prstGeom>
+        </p:spPr>
+        <p:txBody>
+          <a:bodyPr/>
+          <a:lstStyle/>
+          <a:p>
+            <a:pPr marL="266700" indent="-266700" defTabSz="350520">
+              <a:spcBef>
+                <a:spcPts val="1900"/>
+              </a:spcBef>
+              <a:buSzPct val="40000"/>
+              <a:buFontTx/>
+              <a:buBlip>
+                <a:blip r:embed="rId2"/>
+              </a:buBlip>
+              <a:defRPr sz="2160">
+                <a:solidFill>
+                  <a:srgbClr val="737373"/>
+                </a:solidFill>
+              </a:defRPr>
+            </a:pPr>
+            <a:r>
+              <a:rPr b="1">
+                <a:solidFill>
+                  <a:srgbClr val="FF2600"/>
+                </a:solidFill>
+              </a:rPr>
+              <a:t>Marketing</a:t>
+            </a:r>
+            <a:r>
+              <a:t>: new &amp; more efficient ways to acquire customers, and how R could be used to enhance market-mix modelling techniques </a:t>
+            </a:r>
+          </a:p>
+          <a:p>
+            <a:pPr marL="266700" indent="-266700" defTabSz="350520">
+              <a:spcBef>
+                <a:spcPts val="1900"/>
+              </a:spcBef>
+              <a:buSzPct val="40000"/>
+              <a:buFontTx/>
+              <a:buBlip>
+                <a:blip r:embed="rId2"/>
+              </a:buBlip>
+              <a:defRPr sz="2160">
+                <a:solidFill>
+                  <a:srgbClr val="737373"/>
+                </a:solidFill>
+              </a:defRPr>
+            </a:pPr>
+            <a:r>
+              <a:rPr b="1">
+                <a:solidFill>
+                  <a:srgbClr val="FF2600"/>
+                </a:solidFill>
+              </a:rPr>
+              <a:t>Sales</a:t>
+            </a:r>
+            <a:r>
+              <a:t>: how R could improve Yelp's compensation system &amp; pilot new products/price points </a:t>
+            </a:r>
+          </a:p>
+          <a:p>
+            <a:pPr marL="266700" indent="-266700" defTabSz="350520">
+              <a:spcBef>
+                <a:spcPts val="1900"/>
+              </a:spcBef>
+              <a:buSzPct val="40000"/>
+              <a:buFontTx/>
+              <a:buBlip>
+                <a:blip r:embed="rId2"/>
+              </a:buBlip>
+              <a:defRPr sz="2160">
+                <a:solidFill>
+                  <a:srgbClr val="737373"/>
+                </a:solidFill>
+              </a:defRPr>
+            </a:pPr>
+            <a:r>
+              <a:rPr b="1">
+                <a:solidFill>
+                  <a:srgbClr val="FF2600"/>
+                </a:solidFill>
+              </a:rPr>
+              <a:t>Community Management</a:t>
+            </a:r>
+            <a:r>
+              <a:t>: identify new ways to encourage contributions from Yelp users &amp; conduct sentiment analysis of Yelp user reviews </a:t>
+            </a:r>
+          </a:p>
+          <a:p>
+            <a:pPr marL="266700" indent="-266700" defTabSz="350520">
+              <a:spcBef>
+                <a:spcPts val="1900"/>
+              </a:spcBef>
+              <a:buSzPct val="40000"/>
+              <a:buFontTx/>
+              <a:buBlip>
+                <a:blip r:embed="rId2"/>
+              </a:buBlip>
+              <a:defRPr sz="2160">
+                <a:solidFill>
+                  <a:srgbClr val="737373"/>
+                </a:solidFill>
+              </a:defRPr>
+            </a:pPr>
+            <a:r>
+              <a:rPr b="1">
+                <a:solidFill>
+                  <a:srgbClr val="FF2600"/>
+                </a:solidFill>
+              </a:rPr>
+              <a:t>Product</a:t>
+            </a:r>
+            <a:r>
+              <a:t>: using R to identify new products opportunities &amp; priorities </a:t>
+            </a:r>
+          </a:p>
+          <a:p>
+            <a:pPr marL="266700" indent="-266700" defTabSz="350520">
+              <a:spcBef>
+                <a:spcPts val="1900"/>
+              </a:spcBef>
+              <a:buSzPct val="40000"/>
+              <a:buFontTx/>
+              <a:buBlip>
+                <a:blip r:embed="rId2"/>
+              </a:buBlip>
+              <a:defRPr b="1" sz="2160">
+                <a:solidFill>
+                  <a:srgbClr val="737373"/>
+                </a:solidFill>
+              </a:defRPr>
+            </a:pPr>
+            <a:r>
+              <a:rPr>
+                <a:solidFill>
+                  <a:srgbClr val="FF2600"/>
+                </a:solidFill>
+              </a:rPr>
+              <a:t>Engineering</a:t>
+            </a:r>
+            <a:r>
+              <a:t>: </a:t>
+            </a:r>
+            <a:r>
+              <a:rPr b="0"/>
+              <a:t>taping in to existing tools developed by Yelp’s engineering team such elastalert, mrjob, paasta, or undebt. </a:t>
+            </a:r>
+          </a:p>
+        </p:txBody>
+      </p:sp>
+      <p:pic>
+        <p:nvPicPr>
+          <p:cNvPr id="201" name="pasted-image.tiff" descr="pasted-image.tiff"/>
+          <p:cNvPicPr>
+            <a:picLocks noChangeAspect="1"/>
+          </p:cNvPicPr>
+          <p:nvPr/>
+        </p:nvPicPr>
+        <p:blipFill>
+          <a:blip r:embed="rId3">
+            <a:extLst/>
+          </a:blip>
+          <a:srcRect l="16992" t="0" r="16992" b="0"/>
+          <a:stretch>
+            <a:fillRect/>
+          </a:stretch>
+        </p:blipFill>
+        <p:spPr>
+          <a:xfrm>
+            <a:off x="-1168400" y="-2032000"/>
+            <a:ext cx="6438900" cy="9753600"/>
+          </a:xfrm>
+          <a:prstGeom prst="rect">
+            <a:avLst/>
+          </a:prstGeom>
+          <a:ln w="12700">
+            <a:miter lim="400000"/>
+          </a:ln>
+        </p:spPr>
+      </p:pic>
     </p:spTree>
   </p:cSld>
   <p:clrMapOvr>
@@ -5159,7 +5096,7 @@
       </p:grpSpPr>
       <p:sp>
         <p:nvSpPr>
-          <p:cNvPr id="209" name="Line"/>
+          <p:cNvPr id="203" name="Line"/>
           <p:cNvSpPr/>
           <p:nvPr>
             <p:ph type="body" idx="14"/>
@@ -5196,7 +5133,7 @@
       </p:sp>
       <p:sp>
         <p:nvSpPr>
-          <p:cNvPr id="210" name="Next Steps &amp; Opportunities"/>
+          <p:cNvPr id="204" name="Potential Biz-Ops Integrations"/>
           <p:cNvSpPr txBox="1"/>
           <p:nvPr>
             <p:ph type="title"/>
@@ -5210,24 +5147,24 @@
         <p:txBody>
           <a:bodyPr/>
           <a:lstStyle>
-            <a:lvl1pPr defTabSz="502412">
-              <a:spcBef>
-                <a:spcPts val="1900"/>
-              </a:spcBef>
-              <a:defRPr sz="4472"/>
+            <a:lvl1pPr defTabSz="438150">
+              <a:spcBef>
+                <a:spcPts val="1700"/>
+              </a:spcBef>
+              <a:defRPr sz="3900"/>
             </a:lvl1pPr>
           </a:lstStyle>
           <a:p>
             <a:pPr/>
             <a:r>
-              <a:t>Next Steps &amp; Opportunities</a:t>
-            </a:r>
-          </a:p>
-        </p:txBody>
-      </p:sp>
-      <p:sp>
-        <p:nvSpPr>
-          <p:cNvPr id="211" name="Body"/>
+              <a:t>Potential Biz-Ops Integrations</a:t>
+            </a:r>
+          </a:p>
+        </p:txBody>
+      </p:sp>
+      <p:sp>
+        <p:nvSpPr>
+          <p:cNvPr id="205" name="Packages to connect to Google Analytics (RGoogleAnalytics), Salesforce (RForcecom), SQL (Drill + Sergeant), and other tools used at Yelp (Excel, Tableau) are readily available through open-source networks such as CRAN"/>
           <p:cNvSpPr txBox="1"/>
           <p:nvPr>
             <p:ph type="body" sz="half" idx="1"/>
@@ -5242,13 +5179,134 @@
           <a:bodyPr/>
           <a:lstStyle/>
           <a:p>
-            <a:pPr/>
+            <a:pPr marL="431165" indent="-431165" defTabSz="566674">
+              <a:spcBef>
+                <a:spcPts val="3100"/>
+              </a:spcBef>
+              <a:buSzPct val="40000"/>
+              <a:buFontTx/>
+              <a:buBlip>
+                <a:blip r:embed="rId2"/>
+              </a:buBlip>
+              <a:defRPr sz="3492">
+                <a:solidFill>
+                  <a:srgbClr val="737373"/>
+                </a:solidFill>
+              </a:defRPr>
+            </a:pPr>
+            <a:r>
+              <a:t>Packages to connect to Google Analytics (</a:t>
+            </a:r>
+            <a:r>
+              <a:rPr u="sng">
+                <a:solidFill>
+                  <a:srgbClr val="FF2600"/>
+                </a:solidFill>
+                <a:hlinkClick r:id="rId3" invalidUrl="" action="" tgtFrame="" tooltip="" history="1" highlightClick="0" endSnd="0"/>
+              </a:rPr>
+              <a:t>RGoogleAnalytics</a:t>
+            </a:r>
+            <a:r>
+              <a:t>), Salesforce (</a:t>
+            </a:r>
+            <a:r>
+              <a:rPr u="sng">
+                <a:solidFill>
+                  <a:srgbClr val="FF2600"/>
+                </a:solidFill>
+                <a:hlinkClick r:id="rId4" invalidUrl="" action="" tgtFrame="" tooltip="" history="1" highlightClick="0" endSnd="0"/>
+              </a:rPr>
+              <a:t>RForcecom</a:t>
+            </a:r>
+            <a:r>
+              <a:t>), SQL (</a:t>
+            </a:r>
+            <a:r>
+              <a:rPr u="sng">
+                <a:solidFill>
+                  <a:srgbClr val="FF2600"/>
+                </a:solidFill>
+                <a:hlinkClick r:id="rId5" invalidUrl="" action="" tgtFrame="" tooltip="" history="1" highlightClick="0" endSnd="0"/>
+              </a:rPr>
+              <a:t>Drill</a:t>
+            </a:r>
+            <a:r>
+              <a:t> + </a:t>
+            </a:r>
+            <a:r>
+              <a:rPr u="sng">
+                <a:solidFill>
+                  <a:srgbClr val="FF2600"/>
+                </a:solidFill>
+                <a:hlinkClick r:id="rId6" invalidUrl="" action="" tgtFrame="" tooltip="" history="1" highlightClick="0" endSnd="0"/>
+              </a:rPr>
+              <a:t>Sergeant</a:t>
+            </a:r>
+            <a:r>
+              <a:t>), and other tools used at Yelp (Excel, Tableau) are readily available through open-source networks such as CRAN</a:t>
+            </a:r>
           </a:p>
         </p:txBody>
       </p:sp>
       <p:pic>
         <p:nvPicPr>
-          <p:cNvPr id="212" name="pasted-image.tiff" descr="pasted-image.tiff"/>
+          <p:cNvPr id="206" name="pasted-image.tiff" descr="pasted-image.tiff"/>
+          <p:cNvPicPr>
+            <a:picLocks noChangeAspect="1"/>
+          </p:cNvPicPr>
+          <p:nvPr/>
+        </p:nvPicPr>
+        <p:blipFill>
+          <a:blip r:embed="rId7">
+            <a:extLst/>
+          </a:blip>
+          <a:srcRect l="16992" t="0" r="16992" b="0"/>
+          <a:stretch>
+            <a:fillRect/>
+          </a:stretch>
+        </p:blipFill>
+        <p:spPr>
+          <a:xfrm>
+            <a:off x="-1168400" y="-2032000"/>
+            <a:ext cx="6438900" cy="9753600"/>
+          </a:xfrm>
+          <a:prstGeom prst="rect">
+            <a:avLst/>
+          </a:prstGeom>
+          <a:ln w="12700">
+            <a:miter lim="400000"/>
+          </a:ln>
+        </p:spPr>
+      </p:pic>
+    </p:spTree>
+  </p:cSld>
+  <p:clrMapOvr>
+    <a:masterClrMapping/>
+  </p:clrMapOvr>
+  <p:transition xmlns:p14="http://schemas.microsoft.com/office/powerpoint/2010/main" spd="med" advClick="1"/>
+</p:sld>
+</file>
+
+<file path=ppt/slides/slide19.xml><?xml version="1.0" encoding="utf-8"?>
+<p:sld xmlns:a="http://schemas.openxmlformats.org/drawingml/2006/main" xmlns:r="http://schemas.openxmlformats.org/officeDocument/2006/relationships" xmlns:p="http://schemas.openxmlformats.org/presentationml/2006/main" showMasterSp="1" showMasterPhAnim="1">
+  <p:cSld>
+    <p:spTree>
+      <p:nvGrpSpPr>
+        <p:cNvPr id="1" name=""/>
+        <p:cNvGrpSpPr/>
+        <p:nvPr/>
+      </p:nvGrpSpPr>
+      <p:grpSpPr>
+        <a:xfrm>
+          <a:off x="0" y="0"/>
+          <a:ext cx="0" cy="0"/>
+          <a:chOff x="0" y="0"/>
+          <a:chExt cx="0" cy="0"/>
+        </a:xfrm>
+      </p:grpSpPr>
+      <p:pic>
+        <p:nvPicPr>
+          <p:cNvPr id="208" name="pasted-image.tiff" descr="pasted-image.tiff"/>
           <p:cNvPicPr>
             <a:picLocks noChangeAspect="1"/>
           </p:cNvPicPr>
@@ -5258,15 +5316,14 @@
           <a:blip r:embed="rId2">
             <a:extLst/>
           </a:blip>
-          <a:srcRect l="16992" t="0" r="16992" b="0"/>
           <a:stretch>
             <a:fillRect/>
           </a:stretch>
         </p:blipFill>
         <p:spPr>
           <a:xfrm>
-            <a:off x="-1168400" y="-2032000"/>
-            <a:ext cx="6438900" cy="9753600"/>
+            <a:off x="6248400" y="-1727200"/>
+            <a:ext cx="9753600" cy="9753600"/>
           </a:xfrm>
           <a:prstGeom prst="rect">
             <a:avLst/>
@@ -5276,6 +5333,137 @@
           </a:ln>
         </p:spPr>
       </p:pic>
+      <p:sp>
+        <p:nvSpPr>
+          <p:cNvPr id="209" name="Gauging Interest &amp; exploring opportunities"/>
+          <p:cNvSpPr txBox="1"/>
+          <p:nvPr>
+            <p:ph type="title"/>
+          </p:nvPr>
+        </p:nvSpPr>
+        <p:spPr>
+          <a:xfrm>
+            <a:off x="571500" y="1655018"/>
+            <a:ext cx="6773317" cy="4720382"/>
+          </a:xfrm>
+          <a:prstGeom prst="rect">
+            <a:avLst/>
+          </a:prstGeom>
+        </p:spPr>
+        <p:txBody>
+          <a:bodyPr anchor="b"/>
+          <a:lstStyle>
+            <a:lvl1pPr algn="r" defTabSz="531622">
+              <a:lnSpc>
+                <a:spcPct val="80000"/>
+              </a:lnSpc>
+              <a:spcBef>
+                <a:spcPts val="0"/>
+              </a:spcBef>
+              <a:defRPr sz="9100">
+                <a:solidFill>
+                  <a:srgbClr val="5C5C5C"/>
+                </a:solidFill>
+              </a:defRPr>
+            </a:lvl1pPr>
+          </a:lstStyle>
+          <a:p>
+            <a:pPr/>
+            <a:r>
+              <a:t>Gauging Interest &amp; exploring opportunities  </a:t>
+            </a:r>
+          </a:p>
+        </p:txBody>
+      </p:sp>
+      <p:sp>
+        <p:nvSpPr>
+          <p:cNvPr id="210" name="A look beyond the data &amp; dashboard to the implications and opportunities this approach may open up."/>
+          <p:cNvSpPr txBox="1"/>
+          <p:nvPr>
+            <p:ph type="body" sz="quarter" idx="1"/>
+          </p:nvPr>
+        </p:nvSpPr>
+        <p:spPr>
+          <a:xfrm>
+            <a:off x="571500" y="6235700"/>
+            <a:ext cx="6451600" cy="2781797"/>
+          </a:xfrm>
+          <a:prstGeom prst="rect">
+            <a:avLst/>
+          </a:prstGeom>
+        </p:spPr>
+        <p:txBody>
+          <a:bodyPr/>
+          <a:lstStyle>
+            <a:lvl1pPr marL="0" indent="0" algn="r" defTabSz="525779">
+              <a:lnSpc>
+                <a:spcPct val="70000"/>
+              </a:lnSpc>
+              <a:spcBef>
+                <a:spcPts val="500"/>
+              </a:spcBef>
+              <a:buSzTx/>
+              <a:buFontTx/>
+              <a:buNone/>
+              <a:defRPr i="1" sz="4319">
+                <a:solidFill>
+                  <a:srgbClr val="747676"/>
+                </a:solidFill>
+              </a:defRPr>
+            </a:lvl1pPr>
+          </a:lstStyle>
+          <a:p>
+            <a:pPr/>
+            <a:r>
+              <a:t>A look beyond the data &amp; dashboard to the implications and opportunities this approach may open up. </a:t>
+            </a:r>
+          </a:p>
+        </p:txBody>
+      </p:sp>
+      <p:sp>
+        <p:nvSpPr>
+          <p:cNvPr id="211" name="Line"/>
+          <p:cNvSpPr/>
+          <p:nvPr/>
+        </p:nvSpPr>
+        <p:spPr>
+          <a:xfrm flipV="1">
+            <a:off x="571500" y="6184898"/>
+            <a:ext cx="6451600" cy="3"/>
+          </a:xfrm>
+          <a:prstGeom prst="line">
+            <a:avLst/>
+          </a:prstGeom>
+          <a:ln w="38100" cap="rnd">
+            <a:solidFill>
+              <a:srgbClr val="747676"/>
+            </a:solidFill>
+            <a:custDash>
+              <a:ds d="100000" sp="200000"/>
+            </a:custDash>
+          </a:ln>
+        </p:spPr>
+        <p:txBody>
+          <a:bodyPr lIns="50800" tIns="50800" rIns="50800" bIns="50800" anchor="ctr"/>
+          <a:lstStyle/>
+          <a:p>
+            <a:pPr defTabSz="457200">
+              <a:spcBef>
+                <a:spcPts val="0"/>
+              </a:spcBef>
+              <a:defRPr i="0" spc="0" sz="1200">
+                <a:solidFill>
+                  <a:srgbClr val="000000"/>
+                </a:solidFill>
+                <a:latin typeface="Helvetica"/>
+                <a:ea typeface="Helvetica"/>
+                <a:cs typeface="Helvetica"/>
+                <a:sym typeface="Helvetica"/>
+              </a:defRPr>
+            </a:pPr>
+          </a:p>
+        </p:txBody>
+      </p:sp>
     </p:spTree>
   </p:cSld>
   <p:clrMapOvr>
@@ -5545,6 +5733,151 @@
           </a:p>
         </p:txBody>
       </p:sp>
+    </p:spTree>
+  </p:cSld>
+  <p:clrMapOvr>
+    <a:masterClrMapping/>
+  </p:clrMapOvr>
+  <p:transition xmlns:p14="http://schemas.microsoft.com/office/powerpoint/2010/main" spd="med" advClick="1"/>
+</p:sld>
+</file>
+
+<file path=ppt/slides/slide20.xml><?xml version="1.0" encoding="utf-8"?>
+<p:sld xmlns:a="http://schemas.openxmlformats.org/drawingml/2006/main" xmlns:r="http://schemas.openxmlformats.org/officeDocument/2006/relationships" xmlns:p="http://schemas.openxmlformats.org/presentationml/2006/main" showMasterSp="1" showMasterPhAnim="1">
+  <p:cSld>
+    <p:spTree>
+      <p:nvGrpSpPr>
+        <p:cNvPr id="1" name=""/>
+        <p:cNvGrpSpPr/>
+        <p:nvPr/>
+      </p:nvGrpSpPr>
+      <p:grpSpPr>
+        <a:xfrm>
+          <a:off x="0" y="0"/>
+          <a:ext cx="0" cy="0"/>
+          <a:chOff x="0" y="0"/>
+          <a:chExt cx="0" cy="0"/>
+        </a:xfrm>
+      </p:grpSpPr>
+      <p:sp>
+        <p:nvSpPr>
+          <p:cNvPr id="213" name="Line"/>
+          <p:cNvSpPr/>
+          <p:nvPr>
+            <p:ph type="body" idx="14"/>
+          </p:nvPr>
+        </p:nvSpPr>
+        <p:spPr>
+          <a:prstGeom prst="line">
+            <a:avLst/>
+          </a:prstGeom>
+        </p:spPr>
+        <p:txBody>
+          <a:bodyPr/>
+          <a:lstStyle/>
+          <a:p>
+            <a:pPr marL="0" indent="0" defTabSz="457200">
+              <a:spcBef>
+                <a:spcPts val="0"/>
+              </a:spcBef>
+              <a:buSzTx/>
+              <a:buFontTx/>
+              <a:buNone/>
+              <a:defRPr sz="1200">
+                <a:solidFill>
+                  <a:srgbClr val="000000"/>
+                </a:solidFill>
+                <a:latin typeface="Helvetica"/>
+                <a:ea typeface="Helvetica"/>
+                <a:cs typeface="Helvetica"/>
+                <a:sym typeface="Helvetica"/>
+              </a:defRPr>
+            </a:pPr>
+          </a:p>
+        </p:txBody>
+      </p:sp>
+      <p:sp>
+        <p:nvSpPr>
+          <p:cNvPr id="214" name="Questions &amp; Comments"/>
+          <p:cNvSpPr txBox="1"/>
+          <p:nvPr>
+            <p:ph type="title"/>
+          </p:nvPr>
+        </p:nvSpPr>
+        <p:spPr>
+          <a:prstGeom prst="rect">
+            <a:avLst/>
+          </a:prstGeom>
+        </p:spPr>
+        <p:txBody>
+          <a:bodyPr/>
+          <a:lstStyle>
+            <a:lvl1pPr defTabSz="543305">
+              <a:spcBef>
+                <a:spcPts val="2100"/>
+              </a:spcBef>
+              <a:defRPr sz="4836"/>
+            </a:lvl1pPr>
+          </a:lstStyle>
+          <a:p>
+            <a:pPr/>
+            <a:r>
+              <a:t>Questions &amp; Comments</a:t>
+            </a:r>
+          </a:p>
+        </p:txBody>
+      </p:sp>
+      <p:sp>
+        <p:nvSpPr>
+          <p:cNvPr id="215" name="Body"/>
+          <p:cNvSpPr txBox="1"/>
+          <p:nvPr>
+            <p:ph type="body" sz="half" idx="1"/>
+          </p:nvPr>
+        </p:nvSpPr>
+        <p:spPr>
+          <a:prstGeom prst="rect">
+            <a:avLst/>
+          </a:prstGeom>
+        </p:spPr>
+        <p:txBody>
+          <a:bodyPr/>
+          <a:lstStyle/>
+          <a:p>
+            <a:pPr/>
+          </a:p>
+        </p:txBody>
+      </p:sp>
+      <p:pic>
+        <p:nvPicPr>
+          <p:cNvPr id="216" name="pasted-image.tiff" descr="pasted-image.tiff"/>
+          <p:cNvPicPr>
+            <a:picLocks noChangeAspect="1"/>
+          </p:cNvPicPr>
+          <p:nvPr/>
+        </p:nvPicPr>
+        <p:blipFill>
+          <a:blip r:embed="rId2">
+            <a:extLst/>
+          </a:blip>
+          <a:srcRect l="16992" t="0" r="16992" b="0"/>
+          <a:stretch>
+            <a:fillRect/>
+          </a:stretch>
+        </p:blipFill>
+        <p:spPr>
+          <a:xfrm>
+            <a:off x="-1168400" y="-2032000"/>
+            <a:ext cx="6438900" cy="9753600"/>
+          </a:xfrm>
+          <a:prstGeom prst="rect">
+            <a:avLst/>
+          </a:prstGeom>
+          <a:ln w="12700">
+            <a:miter lim="400000"/>
+          </a:ln>
+        </p:spPr>
+      </p:pic>
     </p:spTree>
   </p:cSld>
   <p:clrMapOvr>
@@ -6520,15 +6853,36 @@
           <a:bodyPr/>
           <a:lstStyle/>
           <a:p>
-            <a:pPr/>
+            <a:pPr marL="353568" indent="-353568" defTabSz="508254">
+              <a:spcBef>
+                <a:spcPts val="1500"/>
+              </a:spcBef>
+              <a:defRPr sz="2436"/>
+            </a:pPr>
             <a:r>
               <a:t>Apache Drill &amp; Sergeant - agile, flexible and open-source SQL query engine for Big Data exploration. Allows for data analysis without any ETL or up-front schema definitions</a:t>
             </a:r>
           </a:p>
           <a:p>
-            <a:pPr/>
-            <a:r>
-              <a:t>Shiny &amp; Flexdashboards - combined with R Markdown and R Studio provides a framework for creating powerful, interactive web apps &amp; dashboards. </a:t>
+            <a:pPr marL="353568" indent="-353568" defTabSz="508254">
+              <a:spcBef>
+                <a:spcPts val="1500"/>
+              </a:spcBef>
+              <a:defRPr sz="2436"/>
+            </a:pPr>
+            <a:r>
+              <a:t>Shiny &amp; Flexdashboards - combined with R Markdown and R Studio provides a framework for creating powerful, interactive web documents.</a:t>
+            </a:r>
+          </a:p>
+          <a:p>
+            <a:pPr marL="353568" indent="-353568" defTabSz="508254">
+              <a:spcBef>
+                <a:spcPts val="1500"/>
+              </a:spcBef>
+              <a:defRPr sz="2436"/>
+            </a:pPr>
+            <a:r>
+              <a:t>R is an open-source programming language and software environment for statistical computing &amp; graphics in wide use among data scientists &amp; miners</a:t>
             </a:r>
           </a:p>
         </p:txBody>

</xml_diff>